<commit_message>
After first draft of revision
</commit_message>
<xml_diff>
--- a/_figures/dilemmas.pptx
+++ b/_figures/dilemmas.pptx
@@ -104,6 +104,11 @@
       </a:defRPr>
     </a:lvl9pPr>
   </p:defaultTextStyle>
+  <p:extLst>
+    <p:ext uri="{EFAFB233-063F-42B5-8137-9DF3F51BA10A}">
+      <p15:sldGuideLst xmlns:p15="http://schemas.microsoft.com/office/powerpoint/2012/main"/>
+    </p:ext>
+  </p:extLst>
 </p:presentation>
 </file>
 
@@ -256,7 +261,7 @@
           <a:p>
             <a:fld id="{536951C3-924E-4744-875A-29F4FD6648BC}" type="datetimeFigureOut">
               <a:rPr lang="en-GB" smtClean="0"/>
-              <a:t>17/08/2019</a:t>
+              <a:t>24/12/2019</a:t>
             </a:fld>
             <a:endParaRPr lang="en-GB"/>
           </a:p>
@@ -456,7 +461,7 @@
           <a:p>
             <a:fld id="{536951C3-924E-4744-875A-29F4FD6648BC}" type="datetimeFigureOut">
               <a:rPr lang="en-GB" smtClean="0"/>
-              <a:t>17/08/2019</a:t>
+              <a:t>24/12/2019</a:t>
             </a:fld>
             <a:endParaRPr lang="en-GB"/>
           </a:p>
@@ -666,7 +671,7 @@
           <a:p>
             <a:fld id="{536951C3-924E-4744-875A-29F4FD6648BC}" type="datetimeFigureOut">
               <a:rPr lang="en-GB" smtClean="0"/>
-              <a:t>17/08/2019</a:t>
+              <a:t>24/12/2019</a:t>
             </a:fld>
             <a:endParaRPr lang="en-GB"/>
           </a:p>
@@ -866,7 +871,7 @@
           <a:p>
             <a:fld id="{536951C3-924E-4744-875A-29F4FD6648BC}" type="datetimeFigureOut">
               <a:rPr lang="en-GB" smtClean="0"/>
-              <a:t>17/08/2019</a:t>
+              <a:t>24/12/2019</a:t>
             </a:fld>
             <a:endParaRPr lang="en-GB"/>
           </a:p>
@@ -1142,7 +1147,7 @@
           <a:p>
             <a:fld id="{536951C3-924E-4744-875A-29F4FD6648BC}" type="datetimeFigureOut">
               <a:rPr lang="en-GB" smtClean="0"/>
-              <a:t>17/08/2019</a:t>
+              <a:t>24/12/2019</a:t>
             </a:fld>
             <a:endParaRPr lang="en-GB"/>
           </a:p>
@@ -1410,7 +1415,7 @@
           <a:p>
             <a:fld id="{536951C3-924E-4744-875A-29F4FD6648BC}" type="datetimeFigureOut">
               <a:rPr lang="en-GB" smtClean="0"/>
-              <a:t>17/08/2019</a:t>
+              <a:t>24/12/2019</a:t>
             </a:fld>
             <a:endParaRPr lang="en-GB"/>
           </a:p>
@@ -1825,7 +1830,7 @@
           <a:p>
             <a:fld id="{536951C3-924E-4744-875A-29F4FD6648BC}" type="datetimeFigureOut">
               <a:rPr lang="en-GB" smtClean="0"/>
-              <a:t>17/08/2019</a:t>
+              <a:t>24/12/2019</a:t>
             </a:fld>
             <a:endParaRPr lang="en-GB"/>
           </a:p>
@@ -1967,7 +1972,7 @@
           <a:p>
             <a:fld id="{536951C3-924E-4744-875A-29F4FD6648BC}" type="datetimeFigureOut">
               <a:rPr lang="en-GB" smtClean="0"/>
-              <a:t>17/08/2019</a:t>
+              <a:t>24/12/2019</a:t>
             </a:fld>
             <a:endParaRPr lang="en-GB"/>
           </a:p>
@@ -2080,7 +2085,7 @@
           <a:p>
             <a:fld id="{536951C3-924E-4744-875A-29F4FD6648BC}" type="datetimeFigureOut">
               <a:rPr lang="en-GB" smtClean="0"/>
-              <a:t>17/08/2019</a:t>
+              <a:t>24/12/2019</a:t>
             </a:fld>
             <a:endParaRPr lang="en-GB"/>
           </a:p>
@@ -2393,7 +2398,7 @@
           <a:p>
             <a:fld id="{536951C3-924E-4744-875A-29F4FD6648BC}" type="datetimeFigureOut">
               <a:rPr lang="en-GB" smtClean="0"/>
-              <a:t>17/08/2019</a:t>
+              <a:t>24/12/2019</a:t>
             </a:fld>
             <a:endParaRPr lang="en-GB"/>
           </a:p>
@@ -2682,7 +2687,7 @@
           <a:p>
             <a:fld id="{536951C3-924E-4744-875A-29F4FD6648BC}" type="datetimeFigureOut">
               <a:rPr lang="en-GB" smtClean="0"/>
-              <a:t>17/08/2019</a:t>
+              <a:t>24/12/2019</a:t>
             </a:fld>
             <a:endParaRPr lang="en-GB"/>
           </a:p>
@@ -2925,7 +2930,7 @@
           <a:p>
             <a:fld id="{536951C3-924E-4744-875A-29F4FD6648BC}" type="datetimeFigureOut">
               <a:rPr lang="en-GB" smtClean="0"/>
-              <a:t>17/08/2019</a:t>
+              <a:t>24/12/2019</a:t>
             </a:fld>
             <a:endParaRPr lang="en-GB"/>
           </a:p>
@@ -3342,6 +3347,66 @@
           <a:chExt cx="0" cy="0"/>
         </a:xfrm>
       </p:grpSpPr>
+      <p:pic>
+        <p:nvPicPr>
+          <p:cNvPr id="62" name="Picture 61">
+            <a:extLst>
+              <a:ext uri="{FF2B5EF4-FFF2-40B4-BE49-F238E27FC236}">
+                <a16:creationId xmlns:a16="http://schemas.microsoft.com/office/drawing/2014/main" id="{0E0D8397-DC68-41DB-BCDF-9E49E3658BF6}"/>
+              </a:ext>
+            </a:extLst>
+          </p:cNvPr>
+          <p:cNvPicPr>
+            <a:picLocks noChangeAspect="1"/>
+          </p:cNvPicPr>
+          <p:nvPr/>
+        </p:nvPicPr>
+        <p:blipFill>
+          <a:blip r:embed="rId2"/>
+          <a:stretch>
+            <a:fillRect/>
+          </a:stretch>
+        </p:blipFill>
+        <p:spPr>
+          <a:xfrm rot="16200000" flipV="1">
+            <a:off x="8227706" y="2990641"/>
+            <a:ext cx="1487814" cy="262309"/>
+          </a:xfrm>
+          <a:prstGeom prst="rect">
+            <a:avLst/>
+          </a:prstGeom>
+        </p:spPr>
+      </p:pic>
+      <p:pic>
+        <p:nvPicPr>
+          <p:cNvPr id="2" name="Picture 1">
+            <a:extLst>
+              <a:ext uri="{FF2B5EF4-FFF2-40B4-BE49-F238E27FC236}">
+                <a16:creationId xmlns:a16="http://schemas.microsoft.com/office/drawing/2014/main" id="{F710B582-C89A-4ED4-BA6E-3B791DB256FE}"/>
+              </a:ext>
+            </a:extLst>
+          </p:cNvPr>
+          <p:cNvPicPr>
+            <a:picLocks noChangeAspect="1"/>
+          </p:cNvPicPr>
+          <p:nvPr/>
+        </p:nvPicPr>
+        <p:blipFill>
+          <a:blip r:embed="rId2"/>
+          <a:stretch>
+            <a:fillRect/>
+          </a:stretch>
+        </p:blipFill>
+        <p:spPr>
+          <a:xfrm rot="16200000" flipV="1">
+            <a:off x="2355795" y="2990641"/>
+            <a:ext cx="1487814" cy="262309"/>
+          </a:xfrm>
+          <a:prstGeom prst="rect">
+            <a:avLst/>
+          </a:prstGeom>
+        </p:spPr>
+      </p:pic>
       <p:sp>
         <p:nvSpPr>
           <p:cNvPr id="13" name="Oval 12">
@@ -5556,118 +5621,6 @@
               <a:t>Neutral link</a:t>
             </a:r>
             <a:endParaRPr lang="en-GB" dirty="0"/>
-          </a:p>
-        </p:txBody>
-      </p:sp>
-      <p:sp>
-        <p:nvSpPr>
-          <p:cNvPr id="66" name="Arrow: Up-Down 65">
-            <a:extLst>
-              <a:ext uri="{FF2B5EF4-FFF2-40B4-BE49-F238E27FC236}">
-                <a16:creationId xmlns:a16="http://schemas.microsoft.com/office/drawing/2014/main" id="{3B36306B-3504-4F3C-BE28-223D9CAF4A3B}"/>
-              </a:ext>
-            </a:extLst>
-          </p:cNvPr>
-          <p:cNvSpPr/>
-          <p:nvPr/>
-        </p:nvSpPr>
-        <p:spPr>
-          <a:xfrm>
-            <a:off x="2940864" y="2562840"/>
-            <a:ext cx="267419" cy="1112235"/>
-          </a:xfrm>
-          <a:prstGeom prst="upDownArrow">
-            <a:avLst/>
-          </a:prstGeom>
-          <a:solidFill>
-            <a:schemeClr val="bg1">
-              <a:lumMod val="75000"/>
-            </a:schemeClr>
-          </a:solidFill>
-        </p:spPr>
-        <p:style>
-          <a:lnRef idx="2">
-            <a:schemeClr val="accent1">
-              <a:shade val="50000"/>
-            </a:schemeClr>
-          </a:lnRef>
-          <a:fillRef idx="1">
-            <a:schemeClr val="accent1"/>
-          </a:fillRef>
-          <a:effectRef idx="0">
-            <a:schemeClr val="accent1"/>
-          </a:effectRef>
-          <a:fontRef idx="minor">
-            <a:schemeClr val="lt1"/>
-          </a:fontRef>
-        </p:style>
-        <p:txBody>
-          <a:bodyPr rot="0" spcFirstLastPara="0" vertOverflow="overflow" horzOverflow="overflow" vert="horz" wrap="square" lIns="91440" tIns="45720" rIns="91440" bIns="45720" numCol="1" spcCol="0" rtlCol="0" fromWordArt="0" anchor="ctr" anchorCtr="0" forceAA="0" compatLnSpc="1">
-            <a:prstTxWarp prst="textNoShape">
-              <a:avLst/>
-            </a:prstTxWarp>
-            <a:noAutofit/>
-          </a:bodyPr>
-          <a:lstStyle/>
-          <a:p>
-            <a:pPr algn="ctr"/>
-            <a:endParaRPr lang="en-GB"/>
-          </a:p>
-        </p:txBody>
-      </p:sp>
-      <p:sp>
-        <p:nvSpPr>
-          <p:cNvPr id="67" name="Arrow: Up-Down 66">
-            <a:extLst>
-              <a:ext uri="{FF2B5EF4-FFF2-40B4-BE49-F238E27FC236}">
-                <a16:creationId xmlns:a16="http://schemas.microsoft.com/office/drawing/2014/main" id="{1E9F4DC1-05BF-4878-9F1F-685861FCB1EC}"/>
-              </a:ext>
-            </a:extLst>
-          </p:cNvPr>
-          <p:cNvSpPr/>
-          <p:nvPr/>
-        </p:nvSpPr>
-        <p:spPr>
-          <a:xfrm>
-            <a:off x="8829557" y="2561178"/>
-            <a:ext cx="267419" cy="1112235"/>
-          </a:xfrm>
-          <a:prstGeom prst="upDownArrow">
-            <a:avLst/>
-          </a:prstGeom>
-          <a:solidFill>
-            <a:schemeClr val="bg1">
-              <a:lumMod val="75000"/>
-            </a:schemeClr>
-          </a:solidFill>
-        </p:spPr>
-        <p:style>
-          <a:lnRef idx="2">
-            <a:schemeClr val="accent1">
-              <a:shade val="50000"/>
-            </a:schemeClr>
-          </a:lnRef>
-          <a:fillRef idx="1">
-            <a:schemeClr val="accent1"/>
-          </a:fillRef>
-          <a:effectRef idx="0">
-            <a:schemeClr val="accent1"/>
-          </a:effectRef>
-          <a:fontRef idx="minor">
-            <a:schemeClr val="lt1"/>
-          </a:fontRef>
-        </p:style>
-        <p:txBody>
-          <a:bodyPr rot="0" spcFirstLastPara="0" vertOverflow="overflow" horzOverflow="overflow" vert="horz" wrap="square" lIns="91440" tIns="45720" rIns="91440" bIns="45720" numCol="1" spcCol="0" rtlCol="0" fromWordArt="0" anchor="ctr" anchorCtr="0" forceAA="0" compatLnSpc="1">
-            <a:prstTxWarp prst="textNoShape">
-              <a:avLst/>
-            </a:prstTxWarp>
-            <a:noAutofit/>
-          </a:bodyPr>
-          <a:lstStyle/>
-          <a:p>
-            <a:pPr algn="ctr"/>
-            <a:endParaRPr lang="en-GB"/>
           </a:p>
         </p:txBody>
       </p:sp>

</xml_diff>